<commit_message>
Complete Intro to ML
</commit_message>
<xml_diff>
--- a/Into To ML/Kaggle - Into to ML.pptx
+++ b/Into To ML/Kaggle - Into to ML.pptx
@@ -13,6 +13,8 @@
     <p:sldId id="262" r:id="rId7"/>
     <p:sldId id="263" r:id="rId8"/>
     <p:sldId id="264" r:id="rId9"/>
+    <p:sldId id="265" r:id="rId10"/>
+    <p:sldId id="266" r:id="rId11"/>
   </p:sldIdLst>
   <p:sldSz cx="12192000" cy="6858000"/>
   <p:notesSz cx="6858000" cy="9144000"/>
@@ -7091,14 +7093,14 @@
           <a:p>
             <a:pPr algn="l"/>
             <a:r>
-              <a:rPr lang="en-US" sz="8100"/>
+              <a:rPr lang="en-US" sz="8100" dirty="0"/>
               <a:t>Kaggle</a:t>
             </a:r>
             <a:br>
-              <a:rPr lang="en-US" sz="8100"/>
+              <a:rPr lang="en-US" sz="8100" dirty="0"/>
             </a:br>
             <a:r>
-              <a:rPr lang="en-US" sz="8100"/>
+              <a:rPr lang="en-US" sz="8100" dirty="0"/>
               <a:t>Intro to Machine Learning </a:t>
             </a:r>
           </a:p>
@@ -7206,6 +7208,481 @@
       <p:bldP spid="2" grpId="0"/>
     </p:bldLst>
   </p:timing>
+</p:sld>
+</file>
+
+<file path=ppt/slides/slide10.xml><?xml version="1.0" encoding="utf-8"?>
+<p:sld xmlns:a="http://schemas.openxmlformats.org/drawingml/2006/main" xmlns:r="http://schemas.openxmlformats.org/officeDocument/2006/relationships" xmlns:p="http://schemas.openxmlformats.org/presentationml/2006/main">
+  <p:cSld>
+    <p:bg>
+      <p:bgPr>
+        <a:solidFill>
+          <a:schemeClr val="bg1"/>
+        </a:solidFill>
+        <a:effectLst/>
+      </p:bgPr>
+    </p:bg>
+    <p:spTree>
+      <p:nvGrpSpPr>
+        <p:cNvPr id="1" name=""/>
+        <p:cNvGrpSpPr/>
+        <p:nvPr/>
+      </p:nvGrpSpPr>
+      <p:grpSpPr>
+        <a:xfrm>
+          <a:off x="0" y="0"/>
+          <a:ext cx="0" cy="0"/>
+          <a:chOff x="0" y="0"/>
+          <a:chExt cx="0" cy="0"/>
+        </a:xfrm>
+      </p:grpSpPr>
+      <p:sp useBgFill="1">
+        <p:nvSpPr>
+          <p:cNvPr id="8" name="Rectangle 7">
+            <a:extLst>
+              <a:ext uri="{FF2B5EF4-FFF2-40B4-BE49-F238E27FC236}">
+                <a16:creationId xmlns:a16="http://schemas.microsoft.com/office/drawing/2014/main" id="{DAF1966E-FD40-4A4A-B61B-C4DF7FA05F06}"/>
+              </a:ext>
+              <a:ext uri="{C183D7F6-B498-43B3-948B-1728B52AA6E4}">
+                <adec:decorative xmlns:adec="http://schemas.microsoft.com/office/drawing/2017/decorative" val="1"/>
+              </a:ext>
+            </a:extLst>
+          </p:cNvPr>
+          <p:cNvSpPr>
+            <a:spLocks noGrp="1" noRot="1" noChangeAspect="1" noMove="1" noResize="1" noEditPoints="1" noAdjustHandles="1" noChangeArrowheads="1" noChangeShapeType="1" noTextEdit="1"/>
+          </p:cNvSpPr>
+          <p:nvPr>
+            <p:extLst>
+              <p:ext uri="{386F3935-93C4-4BCD-93E2-E3B085C9AB24}">
+                <p16:designElem xmlns:p16="http://schemas.microsoft.com/office/powerpoint/2015/main" val="1"/>
+              </p:ext>
+            </p:extLst>
+          </p:nvPr>
+        </p:nvSpPr>
+        <p:spPr>
+          <a:xfrm>
+            <a:off x="0" y="0"/>
+            <a:ext cx="12192000" cy="6858000"/>
+          </a:xfrm>
+          <a:prstGeom prst="rect">
+            <a:avLst/>
+          </a:prstGeom>
+          <a:ln>
+            <a:noFill/>
+          </a:ln>
+        </p:spPr>
+        <p:style>
+          <a:lnRef idx="2">
+            <a:schemeClr val="accent1">
+              <a:shade val="50000"/>
+            </a:schemeClr>
+          </a:lnRef>
+          <a:fillRef idx="1">
+            <a:schemeClr val="accent1"/>
+          </a:fillRef>
+          <a:effectRef idx="0">
+            <a:schemeClr val="accent1"/>
+          </a:effectRef>
+          <a:fontRef idx="minor">
+            <a:schemeClr val="lt1"/>
+          </a:fontRef>
+        </p:style>
+        <p:txBody>
+          <a:bodyPr rtlCol="0" anchor="ctr"/>
+          <a:lstStyle/>
+          <a:p>
+            <a:pPr algn="ctr"/>
+            <a:endParaRPr lang="en-US"/>
+          </a:p>
+        </p:txBody>
+      </p:sp>
+      <p:sp useBgFill="1">
+        <p:nvSpPr>
+          <p:cNvPr id="10" name="Rectangle 9">
+            <a:extLst>
+              <a:ext uri="{FF2B5EF4-FFF2-40B4-BE49-F238E27FC236}">
+                <a16:creationId xmlns:a16="http://schemas.microsoft.com/office/drawing/2014/main" id="{047BFA19-D45E-416B-A404-7AF2F3F27017}"/>
+              </a:ext>
+              <a:ext uri="{C183D7F6-B498-43B3-948B-1728B52AA6E4}">
+                <adec:decorative xmlns:adec="http://schemas.microsoft.com/office/drawing/2017/decorative" val="1"/>
+              </a:ext>
+            </a:extLst>
+          </p:cNvPr>
+          <p:cNvSpPr>
+            <a:spLocks noGrp="1" noRot="1" noChangeAspect="1" noMove="1" noResize="1" noEditPoints="1" noAdjustHandles="1" noChangeArrowheads="1" noChangeShapeType="1" noTextEdit="1"/>
+          </p:cNvSpPr>
+          <p:nvPr>
+            <p:extLst>
+              <p:ext uri="{386F3935-93C4-4BCD-93E2-E3B085C9AB24}">
+                <p16:designElem xmlns:p16="http://schemas.microsoft.com/office/powerpoint/2015/main" val="1"/>
+              </p:ext>
+            </p:extLst>
+          </p:nvPr>
+        </p:nvSpPr>
+        <p:spPr>
+          <a:xfrm>
+            <a:off x="558209" y="0"/>
+            <a:ext cx="11167447" cy="2018806"/>
+          </a:xfrm>
+          <a:prstGeom prst="rect">
+            <a:avLst/>
+          </a:prstGeom>
+          <a:ln w="9525">
+            <a:solidFill>
+              <a:srgbClr val="E1E1E1"/>
+            </a:solidFill>
+          </a:ln>
+          <a:effectLst>
+            <a:outerShdw blurRad="50800" dist="38100" dir="2700000" algn="tl" rotWithShape="0">
+              <a:schemeClr val="bg1">
+                <a:lumMod val="85000"/>
+                <a:alpha val="50000"/>
+              </a:schemeClr>
+            </a:outerShdw>
+          </a:effectLst>
+        </p:spPr>
+        <p:style>
+          <a:lnRef idx="2">
+            <a:schemeClr val="accent1">
+              <a:shade val="50000"/>
+            </a:schemeClr>
+          </a:lnRef>
+          <a:fillRef idx="1">
+            <a:schemeClr val="accent1"/>
+          </a:fillRef>
+          <a:effectRef idx="0">
+            <a:schemeClr val="accent1"/>
+          </a:effectRef>
+          <a:fontRef idx="minor">
+            <a:schemeClr val="lt1"/>
+          </a:fontRef>
+        </p:style>
+        <p:txBody>
+          <a:bodyPr rtlCol="0" anchor="ctr"/>
+          <a:lstStyle/>
+          <a:p>
+            <a:pPr marL="0" marR="0" lvl="0" indent="0" algn="ctr" defTabSz="914400" rtl="0" eaLnBrk="1" fontAlgn="auto" latinLnBrk="0" hangingPunct="1">
+              <a:lnSpc>
+                <a:spcPct val="100000"/>
+              </a:lnSpc>
+              <a:spcBef>
+                <a:spcPts val="0"/>
+              </a:spcBef>
+              <a:spcAft>
+                <a:spcPts val="0"/>
+              </a:spcAft>
+              <a:buClrTx/>
+              <a:buSzTx/>
+              <a:buFontTx/>
+              <a:buNone/>
+              <a:tabLst/>
+              <a:defRPr/>
+            </a:pPr>
+            <a:endParaRPr kumimoji="0" lang="en-US" sz="1800" b="0" i="0" u="none" strike="noStrike" kern="1200" cap="none" spc="0" normalizeH="0" baseline="0" noProof="0">
+              <a:ln>
+                <a:noFill/>
+              </a:ln>
+              <a:solidFill>
+                <a:prstClr val="white"/>
+              </a:solidFill>
+              <a:effectLst/>
+              <a:uLnTx/>
+              <a:uFillTx/>
+              <a:latin typeface="Calibri" panose="020F0502020204030204"/>
+              <a:ea typeface="+mn-ea"/>
+              <a:cs typeface="+mn-cs"/>
+            </a:endParaRPr>
+          </a:p>
+        </p:txBody>
+      </p:sp>
+      <p:sp useBgFill="1">
+        <p:nvSpPr>
+          <p:cNvPr id="12" name="Rectangle 11">
+            <a:extLst>
+              <a:ext uri="{FF2B5EF4-FFF2-40B4-BE49-F238E27FC236}">
+                <a16:creationId xmlns:a16="http://schemas.microsoft.com/office/drawing/2014/main" id="{8E0105E7-23DB-4CF2-8258-FF47C7620F6E}"/>
+              </a:ext>
+              <a:ext uri="{C183D7F6-B498-43B3-948B-1728B52AA6E4}">
+                <adec:decorative xmlns:adec="http://schemas.microsoft.com/office/drawing/2017/decorative" val="1"/>
+              </a:ext>
+            </a:extLst>
+          </p:cNvPr>
+          <p:cNvSpPr>
+            <a:spLocks noGrp="1" noRot="1" noChangeAspect="1" noMove="1" noResize="1" noEditPoints="1" noAdjustHandles="1" noChangeArrowheads="1" noChangeShapeType="1" noTextEdit="1"/>
+          </p:cNvSpPr>
+          <p:nvPr>
+            <p:extLst>
+              <p:ext uri="{386F3935-93C4-4BCD-93E2-E3B085C9AB24}">
+                <p16:designElem xmlns:p16="http://schemas.microsoft.com/office/powerpoint/2015/main" val="1"/>
+              </p:ext>
+            </p:extLst>
+          </p:nvPr>
+        </p:nvSpPr>
+        <p:spPr>
+          <a:xfrm>
+            <a:off x="566928" y="0"/>
+            <a:ext cx="11155680" cy="2011680"/>
+          </a:xfrm>
+          <a:prstGeom prst="rect">
+            <a:avLst/>
+          </a:prstGeom>
+          <a:ln w="9525">
+            <a:noFill/>
+          </a:ln>
+          <a:effectLst/>
+        </p:spPr>
+        <p:style>
+          <a:lnRef idx="2">
+            <a:schemeClr val="accent1">
+              <a:shade val="50000"/>
+            </a:schemeClr>
+          </a:lnRef>
+          <a:fillRef idx="1">
+            <a:schemeClr val="accent1"/>
+          </a:fillRef>
+          <a:effectRef idx="0">
+            <a:schemeClr val="accent1"/>
+          </a:effectRef>
+          <a:fontRef idx="minor">
+            <a:schemeClr val="lt1"/>
+          </a:fontRef>
+        </p:style>
+        <p:txBody>
+          <a:bodyPr rtlCol="0" anchor="ctr"/>
+          <a:lstStyle/>
+          <a:p>
+            <a:pPr marL="0" marR="0" lvl="0" indent="0" algn="ctr" defTabSz="914400" rtl="0" eaLnBrk="1" fontAlgn="auto" latinLnBrk="0" hangingPunct="1">
+              <a:lnSpc>
+                <a:spcPct val="100000"/>
+              </a:lnSpc>
+              <a:spcBef>
+                <a:spcPts val="0"/>
+              </a:spcBef>
+              <a:spcAft>
+                <a:spcPts val="0"/>
+              </a:spcAft>
+              <a:buClrTx/>
+              <a:buSzTx/>
+              <a:buFontTx/>
+              <a:buNone/>
+              <a:tabLst/>
+              <a:defRPr/>
+            </a:pPr>
+            <a:endParaRPr kumimoji="0" lang="en-US" sz="1800" b="0" i="0" u="none" strike="noStrike" kern="1200" cap="none" spc="0" normalizeH="0" baseline="0" noProof="0">
+              <a:ln>
+                <a:noFill/>
+              </a:ln>
+              <a:solidFill>
+                <a:prstClr val="white"/>
+              </a:solidFill>
+              <a:effectLst/>
+              <a:uLnTx/>
+              <a:uFillTx/>
+              <a:latin typeface="Calibri" panose="020F0502020204030204"/>
+              <a:ea typeface="+mn-ea"/>
+              <a:cs typeface="+mn-cs"/>
+            </a:endParaRPr>
+          </a:p>
+        </p:txBody>
+      </p:sp>
+      <p:sp>
+        <p:nvSpPr>
+          <p:cNvPr id="2" name="Title 1">
+            <a:extLst>
+              <a:ext uri="{FF2B5EF4-FFF2-40B4-BE49-F238E27FC236}">
+                <a16:creationId xmlns:a16="http://schemas.microsoft.com/office/drawing/2014/main" id="{5A8A891F-CB02-424D-9CEF-D95E1087F120}"/>
+              </a:ext>
+            </a:extLst>
+          </p:cNvPr>
+          <p:cNvSpPr>
+            <a:spLocks noGrp="1"/>
+          </p:cNvSpPr>
+          <p:nvPr>
+            <p:ph type="title"/>
+          </p:nvPr>
+        </p:nvSpPr>
+        <p:spPr>
+          <a:xfrm>
+            <a:off x="1115568" y="548640"/>
+            <a:ext cx="10168128" cy="1179576"/>
+          </a:xfrm>
+        </p:spPr>
+        <p:txBody>
+          <a:bodyPr>
+            <a:normAutofit/>
+          </a:bodyPr>
+          <a:lstStyle/>
+          <a:p>
+            <a:r>
+              <a:rPr lang="en-US" sz="4000" b="1"/>
+              <a:t>Underfitting and Overfitting</a:t>
+            </a:r>
+            <a:endParaRPr lang="en-US" sz="4000"/>
+          </a:p>
+        </p:txBody>
+      </p:sp>
+      <p:sp>
+        <p:nvSpPr>
+          <p:cNvPr id="14" name="Rectangle 13">
+            <a:extLst>
+              <a:ext uri="{FF2B5EF4-FFF2-40B4-BE49-F238E27FC236}">
+                <a16:creationId xmlns:a16="http://schemas.microsoft.com/office/drawing/2014/main" id="{074B4F7D-14B2-478B-8BF5-01E4E0C5D263}"/>
+              </a:ext>
+              <a:ext uri="{C183D7F6-B498-43B3-948B-1728B52AA6E4}">
+                <adec:decorative xmlns:adec="http://schemas.microsoft.com/office/drawing/2017/decorative" val="1"/>
+              </a:ext>
+            </a:extLst>
+          </p:cNvPr>
+          <p:cNvSpPr>
+            <a:spLocks noGrp="1" noRot="1" noChangeAspect="1" noMove="1" noResize="1" noEditPoints="1" noAdjustHandles="1" noChangeArrowheads="1" noChangeShapeType="1" noTextEdit="1"/>
+          </p:cNvSpPr>
+          <p:nvPr>
+            <p:extLst>
+              <p:ext uri="{386F3935-93C4-4BCD-93E2-E3B085C9AB24}">
+                <p16:designElem xmlns:p16="http://schemas.microsoft.com/office/powerpoint/2015/main" val="1"/>
+              </p:ext>
+            </p:extLst>
+          </p:nvPr>
+        </p:nvSpPr>
+        <p:spPr>
+          <a:xfrm>
+            <a:off x="498834" y="758952"/>
+            <a:ext cx="128016" cy="704088"/>
+          </a:xfrm>
+          <a:prstGeom prst="rect">
+            <a:avLst/>
+          </a:prstGeom>
+          <a:solidFill>
+            <a:schemeClr val="accent2"/>
+          </a:solidFill>
+          <a:ln>
+            <a:noFill/>
+          </a:ln>
+        </p:spPr>
+        <p:style>
+          <a:lnRef idx="2">
+            <a:schemeClr val="accent1">
+              <a:shade val="50000"/>
+            </a:schemeClr>
+          </a:lnRef>
+          <a:fillRef idx="1">
+            <a:schemeClr val="accent1"/>
+          </a:fillRef>
+          <a:effectRef idx="0">
+            <a:schemeClr val="accent1"/>
+          </a:effectRef>
+          <a:fontRef idx="minor">
+            <a:schemeClr val="lt1"/>
+          </a:fontRef>
+        </p:style>
+        <p:txBody>
+          <a:bodyPr rtlCol="0" anchor="ctr"/>
+          <a:lstStyle/>
+          <a:p>
+            <a:pPr algn="ctr"/>
+            <a:endParaRPr lang="en-US">
+              <a:solidFill>
+                <a:prstClr val="white"/>
+              </a:solidFill>
+              <a:latin typeface="Calibri" panose="020F0502020204030204"/>
+            </a:endParaRPr>
+          </a:p>
+        </p:txBody>
+      </p:sp>
+      <p:sp>
+        <p:nvSpPr>
+          <p:cNvPr id="3" name="Content Placeholder 2">
+            <a:extLst>
+              <a:ext uri="{FF2B5EF4-FFF2-40B4-BE49-F238E27FC236}">
+                <a16:creationId xmlns:a16="http://schemas.microsoft.com/office/drawing/2014/main" id="{104BC9E8-FD8D-F143-A1D3-9CBE2D6C7A60}"/>
+              </a:ext>
+            </a:extLst>
+          </p:cNvPr>
+          <p:cNvSpPr>
+            <a:spLocks noGrp="1"/>
+          </p:cNvSpPr>
+          <p:nvPr>
+            <p:ph idx="1"/>
+          </p:nvPr>
+        </p:nvSpPr>
+        <p:spPr>
+          <a:xfrm>
+            <a:off x="116249" y="2221992"/>
+            <a:ext cx="11842389" cy="4479750"/>
+          </a:xfrm>
+        </p:spPr>
+        <p:txBody>
+          <a:bodyPr>
+            <a:normAutofit/>
+          </a:bodyPr>
+          <a:lstStyle/>
+          <a:p>
+            <a:pPr marL="0" indent="0" algn="ctr">
+              <a:buNone/>
+            </a:pPr>
+            <a:r>
+              <a:rPr lang="en-US" sz="4000" b="1" dirty="0"/>
+              <a:t>Conclusion</a:t>
+            </a:r>
+          </a:p>
+          <a:p>
+            <a:pPr marL="0" indent="0" algn="ctr">
+              <a:buNone/>
+            </a:pPr>
+            <a:r>
+              <a:rPr lang="en-US" dirty="0"/>
+              <a:t>Here's the takeaway: Models can suffer from either:</a:t>
+            </a:r>
+          </a:p>
+          <a:p>
+            <a:r>
+              <a:rPr lang="en-US" b="1" dirty="0"/>
+              <a:t>Overfitting:</a:t>
+            </a:r>
+            <a:r>
+              <a:rPr lang="en-US" dirty="0"/>
+              <a:t> capturing spurious patterns that won't recur in the future, leading to less accurate predictions, or</a:t>
+            </a:r>
+          </a:p>
+          <a:p>
+            <a:r>
+              <a:rPr lang="en-US" b="1" dirty="0"/>
+              <a:t>Underfitting:</a:t>
+            </a:r>
+            <a:r>
+              <a:rPr lang="en-US" dirty="0"/>
+              <a:t> failing to capture relevant patterns, again leading to less accurate predictions.</a:t>
+            </a:r>
+          </a:p>
+          <a:p>
+            <a:r>
+              <a:rPr lang="en-US" dirty="0"/>
+              <a:t>We use </a:t>
+            </a:r>
+            <a:r>
+              <a:rPr lang="en-US" b="1" dirty="0"/>
+              <a:t>validation</a:t>
+            </a:r>
+            <a:r>
+              <a:rPr lang="en-US" dirty="0"/>
+              <a:t> data, which isn't used in model training, to measure a candidate model's accuracy. This lets us try many candidate models and keep the best one.</a:t>
+            </a:r>
+          </a:p>
+          <a:p>
+            <a:endParaRPr lang="en-US" sz="2200" dirty="0"/>
+          </a:p>
+        </p:txBody>
+      </p:sp>
+    </p:spTree>
+    <p:extLst>
+      <p:ext uri="{BB962C8B-B14F-4D97-AF65-F5344CB8AC3E}">
+        <p14:creationId xmlns:p14="http://schemas.microsoft.com/office/powerpoint/2010/main" val="2175061620"/>
+      </p:ext>
+    </p:extLst>
+  </p:cSld>
+  <p:clrMapOvr>
+    <a:masterClrMapping/>
+  </p:clrMapOvr>
 </p:sld>
 </file>
 
@@ -12248,6 +12725,399 @@
 </p:sld>
 </file>
 
+<file path=ppt/slides/slide9.xml><?xml version="1.0" encoding="utf-8"?>
+<p:sld xmlns:a="http://schemas.openxmlformats.org/drawingml/2006/main" xmlns:r="http://schemas.openxmlformats.org/officeDocument/2006/relationships" xmlns:p="http://schemas.openxmlformats.org/presentationml/2006/main">
+  <p:cSld>
+    <p:bg>
+      <p:bgPr>
+        <a:solidFill>
+          <a:schemeClr val="bg1"/>
+        </a:solidFill>
+        <a:effectLst/>
+      </p:bgPr>
+    </p:bg>
+    <p:spTree>
+      <p:nvGrpSpPr>
+        <p:cNvPr id="1" name=""/>
+        <p:cNvGrpSpPr/>
+        <p:nvPr/>
+      </p:nvGrpSpPr>
+      <p:grpSpPr>
+        <a:xfrm>
+          <a:off x="0" y="0"/>
+          <a:ext cx="0" cy="0"/>
+          <a:chOff x="0" y="0"/>
+          <a:chExt cx="0" cy="0"/>
+        </a:xfrm>
+      </p:grpSpPr>
+      <p:sp useBgFill="1">
+        <p:nvSpPr>
+          <p:cNvPr id="8" name="Rectangle 7">
+            <a:extLst>
+              <a:ext uri="{FF2B5EF4-FFF2-40B4-BE49-F238E27FC236}">
+                <a16:creationId xmlns:a16="http://schemas.microsoft.com/office/drawing/2014/main" id="{1BB867FF-FC45-48F7-8104-F89BE54909F1}"/>
+              </a:ext>
+              <a:ext uri="{C183D7F6-B498-43B3-948B-1728B52AA6E4}">
+                <adec:decorative xmlns:adec="http://schemas.microsoft.com/office/drawing/2017/decorative" val="1"/>
+              </a:ext>
+            </a:extLst>
+          </p:cNvPr>
+          <p:cNvSpPr>
+            <a:spLocks noGrp="1" noRot="1" noChangeAspect="1" noMove="1" noResize="1" noEditPoints="1" noAdjustHandles="1" noChangeArrowheads="1" noChangeShapeType="1" noTextEdit="1"/>
+          </p:cNvSpPr>
+          <p:nvPr>
+            <p:extLst>
+              <p:ext uri="{386F3935-93C4-4BCD-93E2-E3B085C9AB24}">
+                <p16:designElem xmlns:p16="http://schemas.microsoft.com/office/powerpoint/2015/main" val="1"/>
+              </p:ext>
+            </p:extLst>
+          </p:nvPr>
+        </p:nvSpPr>
+        <p:spPr>
+          <a:xfrm>
+            <a:off x="3048" y="0"/>
+            <a:ext cx="12188952" cy="6858000"/>
+          </a:xfrm>
+          <a:prstGeom prst="rect">
+            <a:avLst/>
+          </a:prstGeom>
+          <a:ln>
+            <a:noFill/>
+          </a:ln>
+        </p:spPr>
+        <p:style>
+          <a:lnRef idx="2">
+            <a:schemeClr val="accent1">
+              <a:shade val="50000"/>
+            </a:schemeClr>
+          </a:lnRef>
+          <a:fillRef idx="1">
+            <a:schemeClr val="accent1"/>
+          </a:fillRef>
+          <a:effectRef idx="0">
+            <a:schemeClr val="accent1"/>
+          </a:effectRef>
+          <a:fontRef idx="minor">
+            <a:schemeClr val="lt1"/>
+          </a:fontRef>
+        </p:style>
+        <p:txBody>
+          <a:bodyPr rtlCol="0" anchor="ctr"/>
+          <a:lstStyle/>
+          <a:p>
+            <a:pPr algn="ctr"/>
+            <a:endParaRPr lang="en-US"/>
+          </a:p>
+        </p:txBody>
+      </p:sp>
+      <p:sp>
+        <p:nvSpPr>
+          <p:cNvPr id="10" name="Freeform: Shape 9">
+            <a:extLst>
+              <a:ext uri="{FF2B5EF4-FFF2-40B4-BE49-F238E27FC236}">
+                <a16:creationId xmlns:a16="http://schemas.microsoft.com/office/drawing/2014/main" id="{8BB56887-D0D5-4F0C-9E19-7247EB83C8B7}"/>
+              </a:ext>
+              <a:ext uri="{C183D7F6-B498-43B3-948B-1728B52AA6E4}">
+                <adec:decorative xmlns:adec="http://schemas.microsoft.com/office/drawing/2017/decorative" val="1"/>
+              </a:ext>
+            </a:extLst>
+          </p:cNvPr>
+          <p:cNvSpPr>
+            <a:spLocks noGrp="1" noRot="1" noChangeAspect="1" noMove="1" noResize="1" noEditPoints="1" noAdjustHandles="1" noChangeArrowheads="1" noChangeShapeType="1" noTextEdit="1"/>
+          </p:cNvSpPr>
+          <p:nvPr>
+            <p:extLst>
+              <p:ext uri="{386F3935-93C4-4BCD-93E2-E3B085C9AB24}">
+                <p16:designElem xmlns:p16="http://schemas.microsoft.com/office/powerpoint/2015/main" val="1"/>
+              </p:ext>
+            </p:extLst>
+          </p:nvPr>
+        </p:nvSpPr>
+        <p:spPr>
+          <a:xfrm>
+            <a:off x="10208695" y="1"/>
+            <a:ext cx="1135066" cy="477997"/>
+          </a:xfrm>
+          <a:custGeom>
+            <a:avLst/>
+            <a:gdLst>
+              <a:gd name="connsiteX0" fmla="*/ 0 w 1135066"/>
+              <a:gd name="connsiteY0" fmla="*/ 0 h 477997"/>
+              <a:gd name="connsiteX1" fmla="*/ 1135066 w 1135066"/>
+              <a:gd name="connsiteY1" fmla="*/ 0 h 477997"/>
+              <a:gd name="connsiteX2" fmla="*/ 1133370 w 1135066"/>
+              <a:gd name="connsiteY2" fmla="*/ 16827 h 477997"/>
+              <a:gd name="connsiteX3" fmla="*/ 567533 w 1135066"/>
+              <a:gd name="connsiteY3" fmla="*/ 477997 h 477997"/>
+              <a:gd name="connsiteX4" fmla="*/ 1696 w 1135066"/>
+              <a:gd name="connsiteY4" fmla="*/ 16827 h 477997"/>
+            </a:gdLst>
+            <a:ahLst/>
+            <a:cxnLst>
+              <a:cxn ang="0">
+                <a:pos x="connsiteX0" y="connsiteY0"/>
+              </a:cxn>
+              <a:cxn ang="0">
+                <a:pos x="connsiteX1" y="connsiteY1"/>
+              </a:cxn>
+              <a:cxn ang="0">
+                <a:pos x="connsiteX2" y="connsiteY2"/>
+              </a:cxn>
+              <a:cxn ang="0">
+                <a:pos x="connsiteX3" y="connsiteY3"/>
+              </a:cxn>
+              <a:cxn ang="0">
+                <a:pos x="connsiteX4" y="connsiteY4"/>
+              </a:cxn>
+            </a:cxnLst>
+            <a:rect l="l" t="t" r="r" b="b"/>
+            <a:pathLst>
+              <a:path w="1135066" h="477997">
+                <a:moveTo>
+                  <a:pt x="0" y="0"/>
+                </a:moveTo>
+                <a:lnTo>
+                  <a:pt x="1135066" y="0"/>
+                </a:lnTo>
+                <a:lnTo>
+                  <a:pt x="1133370" y="16827"/>
+                </a:lnTo>
+                <a:cubicBezTo>
+                  <a:pt x="1079514" y="280016"/>
+                  <a:pt x="846644" y="477997"/>
+                  <a:pt x="567533" y="477997"/>
+                </a:cubicBezTo>
+                <a:cubicBezTo>
+                  <a:pt x="288422" y="477997"/>
+                  <a:pt x="55552" y="280016"/>
+                  <a:pt x="1696" y="16827"/>
+                </a:cubicBezTo>
+                <a:close/>
+              </a:path>
+            </a:pathLst>
+          </a:custGeom>
+          <a:solidFill>
+            <a:schemeClr val="accent4"/>
+          </a:solidFill>
+          <a:ln>
+            <a:noFill/>
+          </a:ln>
+        </p:spPr>
+        <p:style>
+          <a:lnRef idx="2">
+            <a:schemeClr val="accent1">
+              <a:shade val="50000"/>
+            </a:schemeClr>
+          </a:lnRef>
+          <a:fillRef idx="1">
+            <a:schemeClr val="accent1"/>
+          </a:fillRef>
+          <a:effectRef idx="0">
+            <a:schemeClr val="accent1"/>
+          </a:effectRef>
+          <a:fontRef idx="minor">
+            <a:schemeClr val="lt1"/>
+          </a:fontRef>
+        </p:style>
+        <p:txBody>
+          <a:bodyPr wrap="square" rtlCol="0" anchor="ctr">
+            <a:noAutofit/>
+          </a:bodyPr>
+          <a:lstStyle/>
+          <a:p>
+            <a:pPr algn="ctr"/>
+            <a:endParaRPr lang="en-US"/>
+          </a:p>
+        </p:txBody>
+      </p:sp>
+      <p:sp>
+        <p:nvSpPr>
+          <p:cNvPr id="2" name="Title 1">
+            <a:extLst>
+              <a:ext uri="{FF2B5EF4-FFF2-40B4-BE49-F238E27FC236}">
+                <a16:creationId xmlns:a16="http://schemas.microsoft.com/office/drawing/2014/main" id="{5A8A891F-CB02-424D-9CEF-D95E1087F120}"/>
+              </a:ext>
+            </a:extLst>
+          </p:cNvPr>
+          <p:cNvSpPr>
+            <a:spLocks noGrp="1"/>
+          </p:cNvSpPr>
+          <p:nvPr>
+            <p:ph type="title"/>
+          </p:nvPr>
+        </p:nvSpPr>
+        <p:spPr>
+          <a:xfrm>
+            <a:off x="838200" y="365125"/>
+            <a:ext cx="10515600" cy="1325563"/>
+          </a:xfrm>
+        </p:spPr>
+        <p:txBody>
+          <a:bodyPr>
+            <a:normAutofit/>
+          </a:bodyPr>
+          <a:lstStyle/>
+          <a:p>
+            <a:r>
+              <a:rPr lang="en-US" b="1" dirty="0"/>
+              <a:t>Underfitting and Overfitting</a:t>
+            </a:r>
+            <a:endParaRPr lang="en-US" dirty="0"/>
+          </a:p>
+        </p:txBody>
+      </p:sp>
+      <p:sp>
+        <p:nvSpPr>
+          <p:cNvPr id="12" name="Arc 11">
+            <a:extLst>
+              <a:ext uri="{FF2B5EF4-FFF2-40B4-BE49-F238E27FC236}">
+                <a16:creationId xmlns:a16="http://schemas.microsoft.com/office/drawing/2014/main" id="{081E4A58-353D-44AE-B2FC-2A74E2E400F7}"/>
+              </a:ext>
+              <a:ext uri="{C183D7F6-B498-43B3-948B-1728B52AA6E4}">
+                <adec:decorative xmlns:adec="http://schemas.microsoft.com/office/drawing/2017/decorative" val="1"/>
+              </a:ext>
+            </a:extLst>
+          </p:cNvPr>
+          <p:cNvSpPr>
+            <a:spLocks noGrp="1" noRot="1" noChangeAspect="1" noMove="1" noResize="1" noEditPoints="1" noAdjustHandles="1" noChangeArrowheads="1" noChangeShapeType="1" noTextEdit="1"/>
+          </p:cNvSpPr>
+          <p:nvPr>
+            <p:extLst>
+              <p:ext uri="{386F3935-93C4-4BCD-93E2-E3B085C9AB24}">
+                <p16:designElem xmlns:p16="http://schemas.microsoft.com/office/powerpoint/2015/main" val="1"/>
+              </p:ext>
+            </p:extLst>
+          </p:nvPr>
+        </p:nvSpPr>
+        <p:spPr>
+          <a:xfrm rot="5400000" flipV="1">
+            <a:off x="555710" y="2183223"/>
+            <a:ext cx="4083433" cy="4083433"/>
+          </a:xfrm>
+          <a:prstGeom prst="arc">
+            <a:avLst/>
+          </a:prstGeom>
+          <a:ln w="127000" cap="rnd">
+            <a:solidFill>
+              <a:schemeClr val="accent4"/>
+            </a:solidFill>
+            <a:prstDash val="dash"/>
+          </a:ln>
+        </p:spPr>
+        <p:style>
+          <a:lnRef idx="1">
+            <a:schemeClr val="accent1"/>
+          </a:lnRef>
+          <a:fillRef idx="0">
+            <a:schemeClr val="accent1"/>
+          </a:fillRef>
+          <a:effectRef idx="0">
+            <a:schemeClr val="accent1"/>
+          </a:effectRef>
+          <a:fontRef idx="minor">
+            <a:schemeClr val="tx1"/>
+          </a:fontRef>
+        </p:style>
+        <p:txBody>
+          <a:bodyPr rtlCol="0" anchor="ctr"/>
+          <a:lstStyle/>
+          <a:p>
+            <a:pPr algn="ctr"/>
+            <a:endParaRPr lang="en-US" dirty="0"/>
+          </a:p>
+        </p:txBody>
+      </p:sp>
+      <p:sp>
+        <p:nvSpPr>
+          <p:cNvPr id="3" name="Content Placeholder 2">
+            <a:extLst>
+              <a:ext uri="{FF2B5EF4-FFF2-40B4-BE49-F238E27FC236}">
+                <a16:creationId xmlns:a16="http://schemas.microsoft.com/office/drawing/2014/main" id="{104BC9E8-FD8D-F143-A1D3-9CBE2D6C7A60}"/>
+              </a:ext>
+            </a:extLst>
+          </p:cNvPr>
+          <p:cNvSpPr>
+            <a:spLocks noGrp="1"/>
+          </p:cNvSpPr>
+          <p:nvPr>
+            <p:ph idx="1"/>
+          </p:nvPr>
+        </p:nvSpPr>
+        <p:spPr>
+          <a:xfrm>
+            <a:off x="200025" y="1423686"/>
+            <a:ext cx="11801475" cy="5220003"/>
+          </a:xfrm>
+        </p:spPr>
+        <p:txBody>
+          <a:bodyPr>
+            <a:normAutofit lnSpcReduction="10000"/>
+          </a:bodyPr>
+          <a:lstStyle/>
+          <a:p>
+            <a:r>
+              <a:rPr lang="en-US" sz="2400" dirty="0"/>
+              <a:t>If a tree only had 1 split, it divides the data into 2 groups. If each group is split again, we would get 4 groups of houses. Splitting each of those again would create 8 groups. If we keep doubling the number of groups by adding more splits at each level, we'll have 2^10 groups of houses by the time we get to the 10th level. That's 1024 leaves.</a:t>
+            </a:r>
+          </a:p>
+          <a:p>
+            <a:endParaRPr lang="en-US" sz="2400" dirty="0"/>
+          </a:p>
+          <a:p>
+            <a:r>
+              <a:rPr lang="en-US" sz="2400" b="1" dirty="0"/>
+              <a:t>overfitting</a:t>
+            </a:r>
+            <a:r>
+              <a:rPr lang="en-US" sz="2400" dirty="0"/>
+              <a:t>, where a model matches the training data almost perfectly, but does poorly in validation and other new data.</a:t>
+            </a:r>
+          </a:p>
+          <a:p>
+            <a:endParaRPr lang="en-US" sz="2400" dirty="0"/>
+          </a:p>
+          <a:p>
+            <a:r>
+              <a:rPr lang="en-US" sz="2400" dirty="0"/>
+              <a:t>When a model fails to capture important distinctions and patterns in the data, so it performs poorly even in training data, that is called </a:t>
+            </a:r>
+            <a:r>
+              <a:rPr lang="en-US" sz="2400" b="1" dirty="0"/>
+              <a:t>underfitting.</a:t>
+            </a:r>
+          </a:p>
+          <a:p>
+            <a:endParaRPr lang="en-US" sz="2400" b="1" dirty="0"/>
+          </a:p>
+          <a:p>
+            <a:r>
+              <a:rPr lang="en-US" sz="2400" dirty="0"/>
+              <a:t>The </a:t>
+            </a:r>
+            <a:r>
+              <a:rPr lang="en-US" sz="2400" i="1" dirty="0" err="1"/>
+              <a:t>max_leaf_nodes</a:t>
+            </a:r>
+            <a:r>
+              <a:rPr lang="en-US" sz="2400" dirty="0"/>
+              <a:t> argument provides a very sensible way to control overfitting vs underfitting. The more leaves we allow the model to make, the more we move from the underfitting area in the above graph to the overfitting area.</a:t>
+            </a:r>
+          </a:p>
+        </p:txBody>
+      </p:sp>
+    </p:spTree>
+    <p:extLst>
+      <p:ext uri="{BB962C8B-B14F-4D97-AF65-F5344CB8AC3E}">
+        <p14:creationId xmlns:p14="http://schemas.microsoft.com/office/powerpoint/2010/main" val="2397926603"/>
+      </p:ext>
+    </p:extLst>
+  </p:cSld>
+  <p:clrMapOvr>
+    <a:masterClrMapping/>
+  </p:clrMapOvr>
+</p:sld>
+</file>
+
 <file path=ppt/theme/theme1.xml><?xml version="1.0" encoding="utf-8"?>
 <a:theme xmlns:a="http://schemas.openxmlformats.org/drawingml/2006/main" name="Office Theme">
   <a:themeElements>

</xml_diff>